<commit_message>
updated version of hw5
</commit_message>
<xml_diff>
--- a/atmo656a_hw5/edgardo_atmo656A_hw4v2_hw5_updated.pptx
+++ b/atmo656a_hw5/edgardo_atmo656A_hw4v2_hw5_updated.pptx
@@ -124,8 +124,7 @@
 <file path=ppt/revisionInfo.xml><?xml version="1.0" encoding="utf-8"?>
 <p1510:revInfo xmlns:a="http://schemas.openxmlformats.org/drawingml/2006/main" xmlns:r="http://schemas.openxmlformats.org/officeDocument/2006/relationships" xmlns:p1510="http://schemas.microsoft.com/office/powerpoint/2015/10/main">
   <p1510:revLst>
-    <p1510:client id="{9AC04871-7E99-4198-ACF8-E9DC25D143FE}" v="78" dt="2024-04-02T22:41:51.319"/>
-    <p1510:client id="{A82A3A1E-D44C-4024-9F87-6097A67AD60E}" v="401" dt="2024-04-02T04:33:01.613"/>
+    <p1510:client id="{9AC04871-7E99-4198-ACF8-E9DC25D143FE}" v="81" dt="2024-04-03T19:43:15.284"/>
   </p1510:revLst>
 </p1510:revInfo>
 </file>
@@ -2046,7 +2045,7 @@
   <pc:docChgLst>
     <pc:chgData name="Sepulveda Araya, Edgardo Ignacio - (edgardo)" userId="7ef1705e-5636-4b2a-a24c-01a2d66995d0" providerId="ADAL" clId="{9AC04871-7E99-4198-ACF8-E9DC25D143FE}"/>
     <pc:docChg chg="custSel mod modSld">
-      <pc:chgData name="Sepulveda Araya, Edgardo Ignacio - (edgardo)" userId="7ef1705e-5636-4b2a-a24c-01a2d66995d0" providerId="ADAL" clId="{9AC04871-7E99-4198-ACF8-E9DC25D143FE}" dt="2024-04-02T22:41:51.319" v="328" actId="20577"/>
+      <pc:chgData name="Sepulveda Araya, Edgardo Ignacio - (edgardo)" userId="7ef1705e-5636-4b2a-a24c-01a2d66995d0" providerId="ADAL" clId="{9AC04871-7E99-4198-ACF8-E9DC25D143FE}" dt="2024-04-03T19:43:42.981" v="341" actId="1076"/>
       <pc:docMkLst>
         <pc:docMk/>
       </pc:docMkLst>
@@ -2182,7 +2181,7 @@
         </pc:picChg>
       </pc:sldChg>
       <pc:sldChg chg="addSp delSp modSp mod">
-        <pc:chgData name="Sepulveda Araya, Edgardo Ignacio - (edgardo)" userId="7ef1705e-5636-4b2a-a24c-01a2d66995d0" providerId="ADAL" clId="{9AC04871-7E99-4198-ACF8-E9DC25D143FE}" dt="2024-04-02T22:41:51.319" v="328" actId="20577"/>
+        <pc:chgData name="Sepulveda Araya, Edgardo Ignacio - (edgardo)" userId="7ef1705e-5636-4b2a-a24c-01a2d66995d0" providerId="ADAL" clId="{9AC04871-7E99-4198-ACF8-E9DC25D143FE}" dt="2024-04-03T19:43:42.981" v="341" actId="1076"/>
         <pc:sldMkLst>
           <pc:docMk/>
           <pc:sldMk cId="2806722646" sldId="269"/>
@@ -2276,7 +2275,7 @@
           </ac:spMkLst>
         </pc:spChg>
         <pc:spChg chg="mod">
-          <ac:chgData name="Sepulveda Araya, Edgardo Ignacio - (edgardo)" userId="7ef1705e-5636-4b2a-a24c-01a2d66995d0" providerId="ADAL" clId="{9AC04871-7E99-4198-ACF8-E9DC25D143FE}" dt="2024-04-02T22:39:10.758" v="294" actId="20577"/>
+          <ac:chgData name="Sepulveda Araya, Edgardo Ignacio - (edgardo)" userId="7ef1705e-5636-4b2a-a24c-01a2d66995d0" providerId="ADAL" clId="{9AC04871-7E99-4198-ACF8-E9DC25D143FE}" dt="2024-04-03T19:42:38.661" v="337" actId="20577"/>
           <ac:spMkLst>
             <pc:docMk/>
             <pc:sldMk cId="2806722646" sldId="269"/>
@@ -2292,7 +2291,7 @@
           </ac:spMkLst>
         </pc:spChg>
         <pc:spChg chg="mod">
-          <ac:chgData name="Sepulveda Araya, Edgardo Ignacio - (edgardo)" userId="7ef1705e-5636-4b2a-a24c-01a2d66995d0" providerId="ADAL" clId="{9AC04871-7E99-4198-ACF8-E9DC25D143FE}" dt="2024-04-02T22:26:03.630" v="288" actId="1076"/>
+          <ac:chgData name="Sepulveda Araya, Edgardo Ignacio - (edgardo)" userId="7ef1705e-5636-4b2a-a24c-01a2d66995d0" providerId="ADAL" clId="{9AC04871-7E99-4198-ACF8-E9DC25D143FE}" dt="2024-04-03T19:43:04.180" v="338" actId="20577"/>
           <ac:spMkLst>
             <pc:docMk/>
             <pc:sldMk cId="2806722646" sldId="269"/>
@@ -2300,7 +2299,7 @@
           </ac:spMkLst>
         </pc:spChg>
         <pc:spChg chg="mod">
-          <ac:chgData name="Sepulveda Araya, Edgardo Ignacio - (edgardo)" userId="7ef1705e-5636-4b2a-a24c-01a2d66995d0" providerId="ADAL" clId="{9AC04871-7E99-4198-ACF8-E9DC25D143FE}" dt="2024-04-02T22:41:51.319" v="328" actId="20577"/>
+          <ac:chgData name="Sepulveda Araya, Edgardo Ignacio - (edgardo)" userId="7ef1705e-5636-4b2a-a24c-01a2d66995d0" providerId="ADAL" clId="{9AC04871-7E99-4198-ACF8-E9DC25D143FE}" dt="2024-04-03T19:43:42.981" v="341" actId="1076"/>
           <ac:spMkLst>
             <pc:docMk/>
             <pc:sldMk cId="2806722646" sldId="269"/>
@@ -3281,7 +3280,7 @@
           <a:p>
             <a:fld id="{DD370EFB-FF82-F344-B36D-D3DDDB4E7075}" type="datetimeFigureOut">
               <a:rPr lang="en-CL" smtClean="0"/>
-              <a:t>04/02/2024</a:t>
+              <a:t>04/03/2024</a:t>
             </a:fld>
             <a:endParaRPr lang="en-CL"/>
           </a:p>
@@ -3703,7 +3702,7 @@
           <a:p>
             <a:fld id="{594619FC-7BE2-FC42-9A78-8910493A16C9}" type="datetimeFigureOut">
               <a:rPr lang="en-CL" smtClean="0"/>
-              <a:t>04/02/2024</a:t>
+              <a:t>04/03/2024</a:t>
             </a:fld>
             <a:endParaRPr lang="en-CL"/>
           </a:p>
@@ -4051,7 +4050,7 @@
           <a:p>
             <a:fld id="{594619FC-7BE2-FC42-9A78-8910493A16C9}" type="datetimeFigureOut">
               <a:rPr lang="en-CL" smtClean="0"/>
-              <a:t>04/02/2024</a:t>
+              <a:t>04/03/2024</a:t>
             </a:fld>
             <a:endParaRPr lang="en-CL"/>
           </a:p>
@@ -4251,7 +4250,7 @@
           <a:p>
             <a:fld id="{594619FC-7BE2-FC42-9A78-8910493A16C9}" type="datetimeFigureOut">
               <a:rPr lang="en-CL" smtClean="0"/>
-              <a:t>04/02/2024</a:t>
+              <a:t>04/03/2024</a:t>
             </a:fld>
             <a:endParaRPr lang="en-CL"/>
           </a:p>
@@ -4461,7 +4460,7 @@
           <a:p>
             <a:fld id="{594619FC-7BE2-FC42-9A78-8910493A16C9}" type="datetimeFigureOut">
               <a:rPr lang="en-CL" smtClean="0"/>
-              <a:t>04/02/2024</a:t>
+              <a:t>04/03/2024</a:t>
             </a:fld>
             <a:endParaRPr lang="en-CL"/>
           </a:p>
@@ -4671,7 +4670,7 @@
           <a:p>
             <a:fld id="{594619FC-7BE2-FC42-9A78-8910493A16C9}" type="datetimeFigureOut">
               <a:rPr lang="en-CL" smtClean="0"/>
-              <a:t>04/02/2024</a:t>
+              <a:t>04/03/2024</a:t>
             </a:fld>
             <a:endParaRPr lang="en-CL"/>
           </a:p>
@@ -4818,7 +4817,7 @@
           <a:p>
             <a:fld id="{594619FC-7BE2-FC42-9A78-8910493A16C9}" type="datetimeFigureOut">
               <a:rPr lang="en-CL" smtClean="0"/>
-              <a:t>04/02/2024</a:t>
+              <a:t>04/03/2024</a:t>
             </a:fld>
             <a:endParaRPr lang="en-CL"/>
           </a:p>
@@ -5002,7 +5001,7 @@
           <a:p>
             <a:fld id="{594619FC-7BE2-FC42-9A78-8910493A16C9}" type="datetimeFigureOut">
               <a:rPr lang="en-CL" smtClean="0"/>
-              <a:t>04/02/2024</a:t>
+              <a:t>04/03/2024</a:t>
             </a:fld>
             <a:endParaRPr lang="en-CL"/>
           </a:p>
@@ -5291,7 +5290,7 @@
           <a:p>
             <a:fld id="{594619FC-7BE2-FC42-9A78-8910493A16C9}" type="datetimeFigureOut">
               <a:rPr lang="en-CL" smtClean="0"/>
-              <a:t>04/02/2024</a:t>
+              <a:t>04/03/2024</a:t>
             </a:fld>
             <a:endParaRPr lang="en-CL"/>
           </a:p>
@@ -5438,7 +5437,7 @@
           <a:p>
             <a:fld id="{594619FC-7BE2-FC42-9A78-8910493A16C9}" type="datetimeFigureOut">
               <a:rPr lang="en-CL" smtClean="0"/>
-              <a:t>04/02/2024</a:t>
+              <a:t>04/03/2024</a:t>
             </a:fld>
             <a:endParaRPr lang="en-CL"/>
           </a:p>
@@ -5714,7 +5713,7 @@
           <a:p>
             <a:fld id="{594619FC-7BE2-FC42-9A78-8910493A16C9}" type="datetimeFigureOut">
               <a:rPr lang="en-CL" smtClean="0"/>
-              <a:t>04/02/2024</a:t>
+              <a:t>04/03/2024</a:t>
             </a:fld>
             <a:endParaRPr lang="en-CL"/>
           </a:p>
@@ -5987,7 +5986,7 @@
           <a:p>
             <a:fld id="{594619FC-7BE2-FC42-9A78-8910493A16C9}" type="datetimeFigureOut">
               <a:rPr lang="en-CL" smtClean="0"/>
-              <a:t>04/02/2024</a:t>
+              <a:t>04/03/2024</a:t>
             </a:fld>
             <a:endParaRPr lang="en-CL"/>
           </a:p>
@@ -6402,7 +6401,7 @@
           <a:p>
             <a:fld id="{594619FC-7BE2-FC42-9A78-8910493A16C9}" type="datetimeFigureOut">
               <a:rPr lang="en-CL" smtClean="0"/>
-              <a:t>04/02/2024</a:t>
+              <a:t>04/03/2024</a:t>
             </a:fld>
             <a:endParaRPr lang="en-CL"/>
           </a:p>
@@ -6645,7 +6644,7 @@
           <a:p>
             <a:fld id="{594619FC-7BE2-FC42-9A78-8910493A16C9}" type="datetimeFigureOut">
               <a:rPr lang="en-CL" smtClean="0"/>
-              <a:t>04/02/2024</a:t>
+              <a:t>04/03/2024</a:t>
             </a:fld>
             <a:endParaRPr lang="en-CL"/>
           </a:p>
@@ -9001,8 +9000,8 @@
           </a:extLst>
         </p:spPr>
       </p:pic>
-      <mc:AlternateContent xmlns:mc="http://schemas.openxmlformats.org/markup-compatibility/2006">
-        <mc:Choice xmlns:a14="http://schemas.microsoft.com/office/drawing/2010/main" Requires="a14">
+      <mc:AlternateContent xmlns:mc="http://schemas.openxmlformats.org/markup-compatibility/2006" xmlns:a14="http://schemas.microsoft.com/office/drawing/2010/main">
+        <mc:Choice Requires="a14">
           <p:sp>
             <p:nvSpPr>
               <p:cNvPr id="4" name="TextBox 3">
@@ -9127,7 +9126,7 @@
             </p:txBody>
           </p:sp>
         </mc:Choice>
-        <mc:Fallback>
+        <mc:Fallback xmlns="">
           <p:sp>
             <p:nvSpPr>
               <p:cNvPr id="4" name="TextBox 3">
@@ -9172,8 +9171,8 @@
           </p:sp>
         </mc:Fallback>
       </mc:AlternateContent>
-      <mc:AlternateContent xmlns:mc="http://schemas.openxmlformats.org/markup-compatibility/2006">
-        <mc:Choice xmlns:a14="http://schemas.microsoft.com/office/drawing/2010/main" Requires="a14">
+      <mc:AlternateContent xmlns:mc="http://schemas.openxmlformats.org/markup-compatibility/2006" xmlns:a14="http://schemas.microsoft.com/office/drawing/2010/main">
+        <mc:Choice Requires="a14">
           <p:sp>
             <p:nvSpPr>
               <p:cNvPr id="6" name="TextBox 5">
@@ -9306,7 +9305,7 @@
             </p:txBody>
           </p:sp>
         </mc:Choice>
-        <mc:Fallback>
+        <mc:Fallback xmlns="">
           <p:sp>
             <p:nvSpPr>
               <p:cNvPr id="6" name="TextBox 5">
@@ -9351,8 +9350,8 @@
           </p:sp>
         </mc:Fallback>
       </mc:AlternateContent>
-      <mc:AlternateContent xmlns:mc="http://schemas.openxmlformats.org/markup-compatibility/2006">
-        <mc:Choice xmlns:a14="http://schemas.microsoft.com/office/drawing/2010/main" Requires="a14">
+      <mc:AlternateContent xmlns:mc="http://schemas.openxmlformats.org/markup-compatibility/2006" xmlns:a14="http://schemas.microsoft.com/office/drawing/2010/main">
+        <mc:Choice Requires="a14">
           <p:sp>
             <p:nvSpPr>
               <p:cNvPr id="8" name="TextBox 7">
@@ -9427,7 +9426,7 @@
             </p:txBody>
           </p:sp>
         </mc:Choice>
-        <mc:Fallback>
+        <mc:Fallback xmlns="">
           <p:sp>
             <p:nvSpPr>
               <p:cNvPr id="8" name="TextBox 7">
@@ -9472,8 +9471,8 @@
           </p:sp>
         </mc:Fallback>
       </mc:AlternateContent>
-      <mc:AlternateContent xmlns:mc="http://schemas.openxmlformats.org/markup-compatibility/2006">
-        <mc:Choice xmlns:a14="http://schemas.microsoft.com/office/drawing/2010/main" Requires="a14">
+      <mc:AlternateContent xmlns:mc="http://schemas.openxmlformats.org/markup-compatibility/2006" xmlns:a14="http://schemas.microsoft.com/office/drawing/2010/main">
+        <mc:Choice Requires="a14">
           <p:sp>
             <p:nvSpPr>
               <p:cNvPr id="9" name="TextBox 8">
@@ -9548,7 +9547,7 @@
             </p:txBody>
           </p:sp>
         </mc:Choice>
-        <mc:Fallback>
+        <mc:Fallback xmlns="">
           <p:sp>
             <p:nvSpPr>
               <p:cNvPr id="9" name="TextBox 8">
@@ -9593,8 +9592,8 @@
           </p:sp>
         </mc:Fallback>
       </mc:AlternateContent>
-      <mc:AlternateContent xmlns:mc="http://schemas.openxmlformats.org/markup-compatibility/2006">
-        <mc:Choice xmlns:a14="http://schemas.microsoft.com/office/drawing/2010/main" Requires="a14">
+      <mc:AlternateContent xmlns:mc="http://schemas.openxmlformats.org/markup-compatibility/2006" xmlns:a14="http://schemas.microsoft.com/office/drawing/2010/main">
+        <mc:Choice Requires="a14">
           <p:sp>
             <p:nvSpPr>
               <p:cNvPr id="10" name="TextBox 9">
@@ -9669,7 +9668,7 @@
             </p:txBody>
           </p:sp>
         </mc:Choice>
-        <mc:Fallback>
+        <mc:Fallback xmlns="">
           <p:sp>
             <p:nvSpPr>
               <p:cNvPr id="10" name="TextBox 9">
@@ -9714,8 +9713,8 @@
           </p:sp>
         </mc:Fallback>
       </mc:AlternateContent>
-      <mc:AlternateContent xmlns:mc="http://schemas.openxmlformats.org/markup-compatibility/2006">
-        <mc:Choice xmlns:a14="http://schemas.microsoft.com/office/drawing/2010/main" Requires="a14">
+      <mc:AlternateContent xmlns:mc="http://schemas.openxmlformats.org/markup-compatibility/2006" xmlns:a14="http://schemas.microsoft.com/office/drawing/2010/main">
+        <mc:Choice Requires="a14">
           <p:sp>
             <p:nvSpPr>
               <p:cNvPr id="11" name="TextBox 10">
@@ -9744,7 +9743,6 @@
               </a:bodyPr>
               <a:lstStyle/>
               <a:p>
-                <a:pPr/>
                 <a:r>
                   <a:rPr lang="en-US" b="0" dirty="0"/>
                   <a:t>And </a:t>
@@ -9854,7 +9852,7 @@
             </p:txBody>
           </p:sp>
         </mc:Choice>
-        <mc:Fallback>
+        <mc:Fallback xmlns="">
           <p:sp>
             <p:nvSpPr>
               <p:cNvPr id="11" name="TextBox 10">
@@ -10002,7 +10000,7 @@
                 </a:r>
                 <a:r>
                   <a:rPr lang="en-US" b="0" dirty="0"/>
-                  <a:t> 	= 9.92 mbar</a:t>
+                  <a:t> 	= 10.03 mbar</a:t>
                 </a:r>
               </a:p>
               <a:p>
@@ -10069,7 +10067,7 @@
               <a:blipFill>
                 <a:blip r:embed="rId9"/>
                 <a:stretch>
-                  <a:fillRect l="-6122" t="-9559" b="-16176"/>
+                  <a:fillRect l="-6122" t="-9559" r="-4592" b="-16176"/>
                 </a:stretch>
               </a:blipFill>
             </p:spPr>
@@ -10180,7 +10178,7 @@
                         <a:rPr lang="en-US" b="0" i="1" smtClean="0">
                           <a:latin typeface="Cambria Math" panose="02040503050406030204" pitchFamily="18" charset="0"/>
                         </a:rPr>
-                        <m:t>=6.4×</m:t>
+                        <m:t>=6.48×</m:t>
                       </m:r>
                       <m:sSup>
                         <m:sSupPr>
@@ -10203,13 +10201,7 @@
                             <a:rPr lang="en-US" b="0" i="1" smtClean="0">
                               <a:latin typeface="Cambria Math" panose="02040503050406030204" pitchFamily="18" charset="0"/>
                             </a:rPr>
-                            <m:t>2</m:t>
-                          </m:r>
-                          <m:r>
-                            <a:rPr lang="en-US" b="0" i="1" smtClean="0">
-                              <a:latin typeface="Cambria Math" panose="02040503050406030204" pitchFamily="18" charset="0"/>
-                            </a:rPr>
-                            <m:t>1</m:t>
+                            <m:t>21</m:t>
                           </m:r>
                         </m:sup>
                       </m:sSup>
@@ -10331,7 +10323,7 @@
             </p:nvSpPr>
             <p:spPr>
               <a:xfrm>
-                <a:off x="9212344" y="5378476"/>
+                <a:off x="9255063" y="5393568"/>
                 <a:ext cx="2456451" cy="369332"/>
               </a:xfrm>
               <a:prstGeom prst="rect">
@@ -10357,7 +10349,7 @@
                 </a14:m>
                 <a:r>
                   <a:rPr lang="en-US" dirty="0"/>
-                  <a:t> T = 0.55, </a:t>
+                  <a:t> T = 0.54, </a:t>
                 </a:r>
                 <a:r>
                   <a:rPr lang="en-US" b="0" dirty="0"/>
@@ -10385,7 +10377,7 @@
             </p:nvSpPr>
             <p:spPr>
               <a:xfrm>
-                <a:off x="9212344" y="5378476"/>
+                <a:off x="9255063" y="5393568"/>
                 <a:ext cx="2456451" cy="369332"/>
               </a:xfrm>
               <a:prstGeom prst="rect">
@@ -10394,7 +10386,7 @@
               <a:blipFill>
                 <a:blip r:embed="rId11"/>
                 <a:stretch>
-                  <a:fillRect t="-8197" b="-24590"/>
+                  <a:fillRect t="-10000" b="-26667"/>
                 </a:stretch>
               </a:blipFill>
             </p:spPr>
@@ -10448,8 +10440,8 @@
           </a:p>
         </p:txBody>
       </p:sp>
-      <mc:AlternateContent xmlns:mc="http://schemas.openxmlformats.org/markup-compatibility/2006">
-        <mc:Choice xmlns:a14="http://schemas.microsoft.com/office/drawing/2010/main" Requires="a14">
+      <mc:AlternateContent xmlns:mc="http://schemas.openxmlformats.org/markup-compatibility/2006" xmlns:a14="http://schemas.microsoft.com/office/drawing/2010/main">
+        <mc:Choice Requires="a14">
           <p:sp>
             <p:nvSpPr>
               <p:cNvPr id="7" name="TextBox 6">
@@ -10589,7 +10581,7 @@
             </p:txBody>
           </p:sp>
         </mc:Choice>
-        <mc:Fallback>
+        <mc:Fallback xmlns="">
           <p:sp>
             <p:nvSpPr>
               <p:cNvPr id="7" name="TextBox 6">

</xml_diff>